<commit_message>
adds final poster in ppt and pdf, and student guidelines
</commit_message>
<xml_diff>
--- a/RD Schematic Report.pptx
+++ b/RD Schematic Report.pptx
@@ -4,6 +4,9 @@
   <p:sldMasterIdLst>
     <p:sldMasterId id="2147483648" r:id="rId1"/>
   </p:sldMasterIdLst>
+  <p:notesMasterIdLst>
+    <p:notesMasterId r:id="rId15"/>
+  </p:notesMasterIdLst>
   <p:sldIdLst>
     <p:sldId id="257" r:id="rId2"/>
     <p:sldId id="259" r:id="rId3"/>
@@ -116,7 +119,446 @@
       </a:defRPr>
     </a:lvl9pPr>
   </p:defaultTextStyle>
+  <p:extLst>
+    <p:ext uri="{EFAFB233-063F-42B5-8137-9DF3F51BA10A}">
+      <p15:sldGuideLst xmlns:p15="http://schemas.microsoft.com/office/powerpoint/2012/main"/>
+    </p:ext>
+  </p:extLst>
 </p:presentation>
+</file>
+
+<file path=ppt/notesMasters/notesMaster1.xml><?xml version="1.0" encoding="utf-8"?>
+<p:notesMaster xmlns:a="http://schemas.openxmlformats.org/drawingml/2006/main" xmlns:r="http://schemas.openxmlformats.org/officeDocument/2006/relationships" xmlns:p="http://schemas.openxmlformats.org/presentationml/2006/main">
+  <p:cSld>
+    <p:bg>
+      <p:bgRef idx="1001">
+        <a:schemeClr val="bg1"/>
+      </p:bgRef>
+    </p:bg>
+    <p:spTree>
+      <p:nvGrpSpPr>
+        <p:cNvPr id="1" name=""/>
+        <p:cNvGrpSpPr/>
+        <p:nvPr/>
+      </p:nvGrpSpPr>
+      <p:grpSpPr>
+        <a:xfrm>
+          <a:off x="0" y="0"/>
+          <a:ext cx="0" cy="0"/>
+          <a:chOff x="0" y="0"/>
+          <a:chExt cx="0" cy="0"/>
+        </a:xfrm>
+      </p:grpSpPr>
+      <p:sp>
+        <p:nvSpPr>
+          <p:cNvPr id="2" name="Header Placeholder 1"/>
+          <p:cNvSpPr>
+            <a:spLocks noGrp="1"/>
+          </p:cNvSpPr>
+          <p:nvPr>
+            <p:ph type="hdr" sz="quarter"/>
+          </p:nvPr>
+        </p:nvSpPr>
+        <p:spPr>
+          <a:xfrm>
+            <a:off x="0" y="0"/>
+            <a:ext cx="2971800" cy="458788"/>
+          </a:xfrm>
+          <a:prstGeom prst="rect">
+            <a:avLst/>
+          </a:prstGeom>
+        </p:spPr>
+        <p:txBody>
+          <a:bodyPr vert="horz" lIns="91440" tIns="45720" rIns="91440" bIns="45720" rtlCol="0"/>
+          <a:lstStyle>
+            <a:lvl1pPr algn="l">
+              <a:defRPr sz="1200"/>
+            </a:lvl1pPr>
+          </a:lstStyle>
+          <a:p>
+            <a:endParaRPr lang="en-US"/>
+          </a:p>
+        </p:txBody>
+      </p:sp>
+      <p:sp>
+        <p:nvSpPr>
+          <p:cNvPr id="3" name="Date Placeholder 2"/>
+          <p:cNvSpPr>
+            <a:spLocks noGrp="1"/>
+          </p:cNvSpPr>
+          <p:nvPr>
+            <p:ph type="dt" idx="1"/>
+          </p:nvPr>
+        </p:nvSpPr>
+        <p:spPr>
+          <a:xfrm>
+            <a:off x="3884613" y="0"/>
+            <a:ext cx="2971800" cy="458788"/>
+          </a:xfrm>
+          <a:prstGeom prst="rect">
+            <a:avLst/>
+          </a:prstGeom>
+        </p:spPr>
+        <p:txBody>
+          <a:bodyPr vert="horz" lIns="91440" tIns="45720" rIns="91440" bIns="45720" rtlCol="0"/>
+          <a:lstStyle>
+            <a:lvl1pPr algn="r">
+              <a:defRPr sz="1200"/>
+            </a:lvl1pPr>
+          </a:lstStyle>
+          <a:p>
+            <a:fld id="{42938470-801B-47F6-9AFA-A19629E6094A}" type="datetimeFigureOut">
+              <a:rPr lang="en-US" smtClean="0"/>
+              <a:t>5/14/2016</a:t>
+            </a:fld>
+            <a:endParaRPr lang="en-US"/>
+          </a:p>
+        </p:txBody>
+      </p:sp>
+      <p:sp>
+        <p:nvSpPr>
+          <p:cNvPr id="4" name="Slide Image Placeholder 3"/>
+          <p:cNvSpPr>
+            <a:spLocks noGrp="1" noRot="1" noChangeAspect="1"/>
+          </p:cNvSpPr>
+          <p:nvPr>
+            <p:ph type="sldImg" idx="2"/>
+          </p:nvPr>
+        </p:nvSpPr>
+        <p:spPr>
+          <a:xfrm>
+            <a:off x="685800" y="1143000"/>
+            <a:ext cx="5486400" cy="3086100"/>
+          </a:xfrm>
+          <a:prstGeom prst="rect">
+            <a:avLst/>
+          </a:prstGeom>
+          <a:noFill/>
+          <a:ln w="12700">
+            <a:solidFill>
+              <a:prstClr val="black"/>
+            </a:solidFill>
+          </a:ln>
+        </p:spPr>
+        <p:txBody>
+          <a:bodyPr vert="horz" lIns="91440" tIns="45720" rIns="91440" bIns="45720" rtlCol="0" anchor="ctr"/>
+          <a:lstStyle/>
+          <a:p>
+            <a:endParaRPr lang="en-US"/>
+          </a:p>
+        </p:txBody>
+      </p:sp>
+      <p:sp>
+        <p:nvSpPr>
+          <p:cNvPr id="5" name="Notes Placeholder 4"/>
+          <p:cNvSpPr>
+            <a:spLocks noGrp="1"/>
+          </p:cNvSpPr>
+          <p:nvPr>
+            <p:ph type="body" sz="quarter" idx="3"/>
+          </p:nvPr>
+        </p:nvSpPr>
+        <p:spPr>
+          <a:xfrm>
+            <a:off x="685800" y="4400550"/>
+            <a:ext cx="5486400" cy="3600450"/>
+          </a:xfrm>
+          <a:prstGeom prst="rect">
+            <a:avLst/>
+          </a:prstGeom>
+        </p:spPr>
+        <p:txBody>
+          <a:bodyPr vert="horz" lIns="91440" tIns="45720" rIns="91440" bIns="45720" rtlCol="0"/>
+          <a:lstStyle/>
+          <a:p>
+            <a:pPr lvl="0"/>
+            <a:r>
+              <a:rPr lang="en-US" smtClean="0"/>
+              <a:t>Click to edit Master text styles</a:t>
+            </a:r>
+          </a:p>
+          <a:p>
+            <a:pPr lvl="1"/>
+            <a:r>
+              <a:rPr lang="en-US" smtClean="0"/>
+              <a:t>Second level</a:t>
+            </a:r>
+          </a:p>
+          <a:p>
+            <a:pPr lvl="2"/>
+            <a:r>
+              <a:rPr lang="en-US" smtClean="0"/>
+              <a:t>Third level</a:t>
+            </a:r>
+          </a:p>
+          <a:p>
+            <a:pPr lvl="3"/>
+            <a:r>
+              <a:rPr lang="en-US" smtClean="0"/>
+              <a:t>Fourth level</a:t>
+            </a:r>
+          </a:p>
+          <a:p>
+            <a:pPr lvl="4"/>
+            <a:r>
+              <a:rPr lang="en-US" smtClean="0"/>
+              <a:t>Fifth level</a:t>
+            </a:r>
+            <a:endParaRPr lang="en-US"/>
+          </a:p>
+        </p:txBody>
+      </p:sp>
+      <p:sp>
+        <p:nvSpPr>
+          <p:cNvPr id="6" name="Footer Placeholder 5"/>
+          <p:cNvSpPr>
+            <a:spLocks noGrp="1"/>
+          </p:cNvSpPr>
+          <p:nvPr>
+            <p:ph type="ftr" sz="quarter" idx="4"/>
+          </p:nvPr>
+        </p:nvSpPr>
+        <p:spPr>
+          <a:xfrm>
+            <a:off x="0" y="8685213"/>
+            <a:ext cx="2971800" cy="458787"/>
+          </a:xfrm>
+          <a:prstGeom prst="rect">
+            <a:avLst/>
+          </a:prstGeom>
+        </p:spPr>
+        <p:txBody>
+          <a:bodyPr vert="horz" lIns="91440" tIns="45720" rIns="91440" bIns="45720" rtlCol="0" anchor="b"/>
+          <a:lstStyle>
+            <a:lvl1pPr algn="l">
+              <a:defRPr sz="1200"/>
+            </a:lvl1pPr>
+          </a:lstStyle>
+          <a:p>
+            <a:endParaRPr lang="en-US"/>
+          </a:p>
+        </p:txBody>
+      </p:sp>
+      <p:sp>
+        <p:nvSpPr>
+          <p:cNvPr id="7" name="Slide Number Placeholder 6"/>
+          <p:cNvSpPr>
+            <a:spLocks noGrp="1"/>
+          </p:cNvSpPr>
+          <p:nvPr>
+            <p:ph type="sldNum" sz="quarter" idx="5"/>
+          </p:nvPr>
+        </p:nvSpPr>
+        <p:spPr>
+          <a:xfrm>
+            <a:off x="3884613" y="8685213"/>
+            <a:ext cx="2971800" cy="458787"/>
+          </a:xfrm>
+          <a:prstGeom prst="rect">
+            <a:avLst/>
+          </a:prstGeom>
+        </p:spPr>
+        <p:txBody>
+          <a:bodyPr vert="horz" lIns="91440" tIns="45720" rIns="91440" bIns="45720" rtlCol="0" anchor="b"/>
+          <a:lstStyle>
+            <a:lvl1pPr algn="r">
+              <a:defRPr sz="1200"/>
+            </a:lvl1pPr>
+          </a:lstStyle>
+          <a:p>
+            <a:fld id="{376D9A3D-2FEF-4999-A0A6-4D57086EB09D}" type="slidenum">
+              <a:rPr lang="en-US" smtClean="0"/>
+              <a:t>‹#›</a:t>
+            </a:fld>
+            <a:endParaRPr lang="en-US"/>
+          </a:p>
+        </p:txBody>
+      </p:sp>
+    </p:spTree>
+    <p:extLst>
+      <p:ext uri="{BB962C8B-B14F-4D97-AF65-F5344CB8AC3E}">
+        <p14:creationId xmlns:p14="http://schemas.microsoft.com/office/powerpoint/2010/main" val="192499209"/>
+      </p:ext>
+    </p:extLst>
+  </p:cSld>
+  <p:clrMap bg1="lt1" tx1="dk1" bg2="lt2" tx2="dk2" accent1="accent1" accent2="accent2" accent3="accent3" accent4="accent4" accent5="accent5" accent6="accent6" hlink="hlink" folHlink="folHlink"/>
+  <p:notesStyle>
+    <a:lvl1pPr marL="0" algn="l" defTabSz="914400" rtl="0" eaLnBrk="1" latinLnBrk="0" hangingPunct="1">
+      <a:defRPr sz="1200" kern="1200">
+        <a:solidFill>
+          <a:schemeClr val="tx1"/>
+        </a:solidFill>
+        <a:latin typeface="+mn-lt"/>
+        <a:ea typeface="+mn-ea"/>
+        <a:cs typeface="+mn-cs"/>
+      </a:defRPr>
+    </a:lvl1pPr>
+    <a:lvl2pPr marL="457200" algn="l" defTabSz="914400" rtl="0" eaLnBrk="1" latinLnBrk="0" hangingPunct="1">
+      <a:defRPr sz="1200" kern="1200">
+        <a:solidFill>
+          <a:schemeClr val="tx1"/>
+        </a:solidFill>
+        <a:latin typeface="+mn-lt"/>
+        <a:ea typeface="+mn-ea"/>
+        <a:cs typeface="+mn-cs"/>
+      </a:defRPr>
+    </a:lvl2pPr>
+    <a:lvl3pPr marL="914400" algn="l" defTabSz="914400" rtl="0" eaLnBrk="1" latinLnBrk="0" hangingPunct="1">
+      <a:defRPr sz="1200" kern="1200">
+        <a:solidFill>
+          <a:schemeClr val="tx1"/>
+        </a:solidFill>
+        <a:latin typeface="+mn-lt"/>
+        <a:ea typeface="+mn-ea"/>
+        <a:cs typeface="+mn-cs"/>
+      </a:defRPr>
+    </a:lvl3pPr>
+    <a:lvl4pPr marL="1371600" algn="l" defTabSz="914400" rtl="0" eaLnBrk="1" latinLnBrk="0" hangingPunct="1">
+      <a:defRPr sz="1200" kern="1200">
+        <a:solidFill>
+          <a:schemeClr val="tx1"/>
+        </a:solidFill>
+        <a:latin typeface="+mn-lt"/>
+        <a:ea typeface="+mn-ea"/>
+        <a:cs typeface="+mn-cs"/>
+      </a:defRPr>
+    </a:lvl4pPr>
+    <a:lvl5pPr marL="1828800" algn="l" defTabSz="914400" rtl="0" eaLnBrk="1" latinLnBrk="0" hangingPunct="1">
+      <a:defRPr sz="1200" kern="1200">
+        <a:solidFill>
+          <a:schemeClr val="tx1"/>
+        </a:solidFill>
+        <a:latin typeface="+mn-lt"/>
+        <a:ea typeface="+mn-ea"/>
+        <a:cs typeface="+mn-cs"/>
+      </a:defRPr>
+    </a:lvl5pPr>
+    <a:lvl6pPr marL="2286000" algn="l" defTabSz="914400" rtl="0" eaLnBrk="1" latinLnBrk="0" hangingPunct="1">
+      <a:defRPr sz="1200" kern="1200">
+        <a:solidFill>
+          <a:schemeClr val="tx1"/>
+        </a:solidFill>
+        <a:latin typeface="+mn-lt"/>
+        <a:ea typeface="+mn-ea"/>
+        <a:cs typeface="+mn-cs"/>
+      </a:defRPr>
+    </a:lvl6pPr>
+    <a:lvl7pPr marL="2743200" algn="l" defTabSz="914400" rtl="0" eaLnBrk="1" latinLnBrk="0" hangingPunct="1">
+      <a:defRPr sz="1200" kern="1200">
+        <a:solidFill>
+          <a:schemeClr val="tx1"/>
+        </a:solidFill>
+        <a:latin typeface="+mn-lt"/>
+        <a:ea typeface="+mn-ea"/>
+        <a:cs typeface="+mn-cs"/>
+      </a:defRPr>
+    </a:lvl7pPr>
+    <a:lvl8pPr marL="3200400" algn="l" defTabSz="914400" rtl="0" eaLnBrk="1" latinLnBrk="0" hangingPunct="1">
+      <a:defRPr sz="1200" kern="1200">
+        <a:solidFill>
+          <a:schemeClr val="tx1"/>
+        </a:solidFill>
+        <a:latin typeface="+mn-lt"/>
+        <a:ea typeface="+mn-ea"/>
+        <a:cs typeface="+mn-cs"/>
+      </a:defRPr>
+    </a:lvl8pPr>
+    <a:lvl9pPr marL="3657600" algn="l" defTabSz="914400" rtl="0" eaLnBrk="1" latinLnBrk="0" hangingPunct="1">
+      <a:defRPr sz="1200" kern="1200">
+        <a:solidFill>
+          <a:schemeClr val="tx1"/>
+        </a:solidFill>
+        <a:latin typeface="+mn-lt"/>
+        <a:ea typeface="+mn-ea"/>
+        <a:cs typeface="+mn-cs"/>
+      </a:defRPr>
+    </a:lvl9pPr>
+  </p:notesStyle>
+</p:notesMaster>
+</file>
+
+<file path=ppt/notesSlides/notesSlide1.xml><?xml version="1.0" encoding="utf-8"?>
+<p:notes xmlns:a="http://schemas.openxmlformats.org/drawingml/2006/main" xmlns:r="http://schemas.openxmlformats.org/officeDocument/2006/relationships" xmlns:p="http://schemas.openxmlformats.org/presentationml/2006/main">
+  <p:cSld>
+    <p:spTree>
+      <p:nvGrpSpPr>
+        <p:cNvPr id="1" name=""/>
+        <p:cNvGrpSpPr/>
+        <p:nvPr/>
+      </p:nvGrpSpPr>
+      <p:grpSpPr>
+        <a:xfrm>
+          <a:off x="0" y="0"/>
+          <a:ext cx="0" cy="0"/>
+          <a:chOff x="0" y="0"/>
+          <a:chExt cx="0" cy="0"/>
+        </a:xfrm>
+      </p:grpSpPr>
+      <p:sp>
+        <p:nvSpPr>
+          <p:cNvPr id="2" name="Slide Image Placeholder 1"/>
+          <p:cNvSpPr>
+            <a:spLocks noGrp="1" noRot="1" noChangeAspect="1"/>
+          </p:cNvSpPr>
+          <p:nvPr>
+            <p:ph type="sldImg"/>
+          </p:nvPr>
+        </p:nvSpPr>
+        <p:spPr/>
+      </p:sp>
+      <p:sp>
+        <p:nvSpPr>
+          <p:cNvPr id="3" name="Notes Placeholder 2"/>
+          <p:cNvSpPr>
+            <a:spLocks noGrp="1"/>
+          </p:cNvSpPr>
+          <p:nvPr>
+            <p:ph type="body" idx="1"/>
+          </p:nvPr>
+        </p:nvSpPr>
+        <p:spPr/>
+        <p:txBody>
+          <a:bodyPr/>
+          <a:lstStyle/>
+          <a:p>
+            <a:endParaRPr lang="en-US"/>
+          </a:p>
+        </p:txBody>
+      </p:sp>
+      <p:sp>
+        <p:nvSpPr>
+          <p:cNvPr id="4" name="Slide Number Placeholder 3"/>
+          <p:cNvSpPr>
+            <a:spLocks noGrp="1"/>
+          </p:cNvSpPr>
+          <p:nvPr>
+            <p:ph type="sldNum" sz="quarter" idx="10"/>
+          </p:nvPr>
+        </p:nvSpPr>
+        <p:spPr/>
+        <p:txBody>
+          <a:bodyPr/>
+          <a:lstStyle/>
+          <a:p>
+            <a:fld id="{376D9A3D-2FEF-4999-A0A6-4D57086EB09D}" type="slidenum">
+              <a:rPr lang="en-US" smtClean="0"/>
+              <a:t>2</a:t>
+            </a:fld>
+            <a:endParaRPr lang="en-US"/>
+          </a:p>
+        </p:txBody>
+      </p:sp>
+    </p:spTree>
+    <p:extLst>
+      <p:ext uri="{BB962C8B-B14F-4D97-AF65-F5344CB8AC3E}">
+        <p14:creationId xmlns:p14="http://schemas.microsoft.com/office/powerpoint/2010/main" val="3743102138"/>
+      </p:ext>
+    </p:extLst>
+  </p:cSld>
+  <p:clrMapOvr>
+    <a:masterClrMapping/>
+  </p:clrMapOvr>
+</p:notes>
 </file>
 
 <file path=ppt/slideLayouts/slideLayout1.xml><?xml version="1.0" encoding="utf-8"?>
@@ -248,9 +690,9 @@
           <a:bodyPr/>
           <a:lstStyle/>
           <a:p>
-            <a:fld id="{E76526BD-44C9-4378-A47E-308D233875DC}" type="datetimeFigureOut">
-              <a:rPr lang="en-US" smtClean="0"/>
-              <a:t>5/8/2016</a:t>
+            <a:fld id="{1FB1C2E2-38E7-4EC1-A544-8229A458A952}" type="datetime1">
+              <a:rPr lang="en-US" smtClean="0"/>
+              <a:t>5/14/2016</a:t>
             </a:fld>
             <a:endParaRPr lang="en-US"/>
           </a:p>
@@ -418,9 +860,9 @@
           <a:bodyPr/>
           <a:lstStyle/>
           <a:p>
-            <a:fld id="{E76526BD-44C9-4378-A47E-308D233875DC}" type="datetimeFigureOut">
-              <a:rPr lang="en-US" smtClean="0"/>
-              <a:t>5/8/2016</a:t>
+            <a:fld id="{7C73128E-63BD-431E-9975-33476DCD9131}" type="datetime1">
+              <a:rPr lang="en-US" smtClean="0"/>
+              <a:t>5/14/2016</a:t>
             </a:fld>
             <a:endParaRPr lang="en-US"/>
           </a:p>
@@ -598,9 +1040,9 @@
           <a:bodyPr/>
           <a:lstStyle/>
           <a:p>
-            <a:fld id="{E76526BD-44C9-4378-A47E-308D233875DC}" type="datetimeFigureOut">
-              <a:rPr lang="en-US" smtClean="0"/>
-              <a:t>5/8/2016</a:t>
+            <a:fld id="{B6148F70-5727-4D85-B17B-62872CE8DBA8}" type="datetime1">
+              <a:rPr lang="en-US" smtClean="0"/>
+              <a:t>5/14/2016</a:t>
             </a:fld>
             <a:endParaRPr lang="en-US"/>
           </a:p>
@@ -768,9 +1210,9 @@
           <a:bodyPr/>
           <a:lstStyle/>
           <a:p>
-            <a:fld id="{E76526BD-44C9-4378-A47E-308D233875DC}" type="datetimeFigureOut">
-              <a:rPr lang="en-US" smtClean="0"/>
-              <a:t>5/8/2016</a:t>
+            <a:fld id="{3981701D-9B47-484F-9912-00B19341A433}" type="datetime1">
+              <a:rPr lang="en-US" smtClean="0"/>
+              <a:t>5/14/2016</a:t>
             </a:fld>
             <a:endParaRPr lang="en-US"/>
           </a:p>
@@ -1014,9 +1456,9 @@
           <a:bodyPr/>
           <a:lstStyle/>
           <a:p>
-            <a:fld id="{E76526BD-44C9-4378-A47E-308D233875DC}" type="datetimeFigureOut">
-              <a:rPr lang="en-US" smtClean="0"/>
-              <a:t>5/8/2016</a:t>
+            <a:fld id="{C83F0E32-3A9D-4227-A733-D45AADE2A323}" type="datetime1">
+              <a:rPr lang="en-US" smtClean="0"/>
+              <a:t>5/14/2016</a:t>
             </a:fld>
             <a:endParaRPr lang="en-US"/>
           </a:p>
@@ -1246,9 +1688,9 @@
           <a:bodyPr/>
           <a:lstStyle/>
           <a:p>
-            <a:fld id="{E76526BD-44C9-4378-A47E-308D233875DC}" type="datetimeFigureOut">
-              <a:rPr lang="en-US" smtClean="0"/>
-              <a:t>5/8/2016</a:t>
+            <a:fld id="{3CC2A56F-9527-49DB-8ECE-7C94072DECF1}" type="datetime1">
+              <a:rPr lang="en-US" smtClean="0"/>
+              <a:t>5/14/2016</a:t>
             </a:fld>
             <a:endParaRPr lang="en-US"/>
           </a:p>
@@ -1613,9 +2055,9 @@
           <a:bodyPr/>
           <a:lstStyle/>
           <a:p>
-            <a:fld id="{E76526BD-44C9-4378-A47E-308D233875DC}" type="datetimeFigureOut">
-              <a:rPr lang="en-US" smtClean="0"/>
-              <a:t>5/8/2016</a:t>
+            <a:fld id="{8EB90EFD-78B2-4E9E-90C2-4D955E9C1CE3}" type="datetime1">
+              <a:rPr lang="en-US" smtClean="0"/>
+              <a:t>5/14/2016</a:t>
             </a:fld>
             <a:endParaRPr lang="en-US"/>
           </a:p>
@@ -1731,9 +2173,9 @@
           <a:bodyPr/>
           <a:lstStyle/>
           <a:p>
-            <a:fld id="{E76526BD-44C9-4378-A47E-308D233875DC}" type="datetimeFigureOut">
-              <a:rPr lang="en-US" smtClean="0"/>
-              <a:t>5/8/2016</a:t>
+            <a:fld id="{0A98CDED-5DAE-419E-B9EE-9B34805F8583}" type="datetime1">
+              <a:rPr lang="en-US" smtClean="0"/>
+              <a:t>5/14/2016</a:t>
             </a:fld>
             <a:endParaRPr lang="en-US"/>
           </a:p>
@@ -1826,9 +2268,9 @@
           <a:bodyPr/>
           <a:lstStyle/>
           <a:p>
-            <a:fld id="{E76526BD-44C9-4378-A47E-308D233875DC}" type="datetimeFigureOut">
-              <a:rPr lang="en-US" smtClean="0"/>
-              <a:t>5/8/2016</a:t>
+            <a:fld id="{1F612BCC-5375-4920-87E7-04806CAA7B19}" type="datetime1">
+              <a:rPr lang="en-US" smtClean="0"/>
+              <a:t>5/14/2016</a:t>
             </a:fld>
             <a:endParaRPr lang="en-US"/>
           </a:p>
@@ -2103,9 +2545,9 @@
           <a:bodyPr/>
           <a:lstStyle/>
           <a:p>
-            <a:fld id="{E76526BD-44C9-4378-A47E-308D233875DC}" type="datetimeFigureOut">
-              <a:rPr lang="en-US" smtClean="0"/>
-              <a:t>5/8/2016</a:t>
+            <a:fld id="{C337DDDC-BDB7-4885-A344-770270A3052C}" type="datetime1">
+              <a:rPr lang="en-US" smtClean="0"/>
+              <a:t>5/14/2016</a:t>
             </a:fld>
             <a:endParaRPr lang="en-US"/>
           </a:p>
@@ -2356,9 +2798,9 @@
           <a:bodyPr/>
           <a:lstStyle/>
           <a:p>
-            <a:fld id="{E76526BD-44C9-4378-A47E-308D233875DC}" type="datetimeFigureOut">
-              <a:rPr lang="en-US" smtClean="0"/>
-              <a:t>5/8/2016</a:t>
+            <a:fld id="{46382AD5-1CD9-4007-98AF-688D1D429C9E}" type="datetime1">
+              <a:rPr lang="en-US" smtClean="0"/>
+              <a:t>5/14/2016</a:t>
             </a:fld>
             <a:endParaRPr lang="en-US"/>
           </a:p>
@@ -2569,9 +3011,9 @@
             </a:lvl1pPr>
           </a:lstStyle>
           <a:p>
-            <a:fld id="{E76526BD-44C9-4378-A47E-308D233875DC}" type="datetimeFigureOut">
-              <a:rPr lang="en-US" smtClean="0"/>
-              <a:t>5/8/2016</a:t>
+            <a:fld id="{63F0AA68-B25C-47AC-B73C-88130D348A29}" type="datetime1">
+              <a:rPr lang="en-US" smtClean="0"/>
+              <a:t>5/14/2016</a:t>
             </a:fld>
             <a:endParaRPr lang="en-US"/>
           </a:p>
@@ -2676,6 +3118,7 @@
     <p:sldLayoutId id="2147483658" r:id="rId10"/>
     <p:sldLayoutId id="2147483659" r:id="rId11"/>
   </p:sldLayoutIdLst>
+  <p:hf hdr="0" ftr="0" dt="0"/>
   <p:txStyles>
     <p:titleStyle>
       <a:lvl1pPr algn="l" defTabSz="914400" rtl="0" eaLnBrk="1" latinLnBrk="0" hangingPunct="1">
@@ -3196,6 +3639,29 @@
           </a:p>
         </p:txBody>
       </p:sp>
+      <p:sp>
+        <p:nvSpPr>
+          <p:cNvPr id="3" name="Slide Number Placeholder 2"/>
+          <p:cNvSpPr>
+            <a:spLocks noGrp="1"/>
+          </p:cNvSpPr>
+          <p:nvPr>
+            <p:ph type="sldNum" sz="quarter" idx="12"/>
+          </p:nvPr>
+        </p:nvSpPr>
+        <p:spPr/>
+        <p:txBody>
+          <a:bodyPr/>
+          <a:lstStyle/>
+          <a:p>
+            <a:fld id="{44B534F3-EDBB-4952-9E24-9629D31653E6}" type="slidenum">
+              <a:rPr lang="en-US" smtClean="0"/>
+              <a:t>1</a:t>
+            </a:fld>
+            <a:endParaRPr lang="en-US" dirty="0"/>
+          </a:p>
+        </p:txBody>
+      </p:sp>
     </p:spTree>
     <p:extLst>
       <p:ext uri="{BB962C8B-B14F-4D97-AF65-F5344CB8AC3E}">
@@ -3380,7 +3846,7 @@
         </p:blipFill>
         <p:spPr>
           <a:xfrm>
-            <a:off x="8235351" y="6140937"/>
+            <a:off x="7773438" y="6140937"/>
             <a:ext cx="3358551" cy="717063"/>
           </a:xfrm>
           <a:prstGeom prst="rect">
@@ -3490,6 +3956,29 @@
               <a:t>Shark</a:t>
             </a:r>
             <a:endParaRPr lang="en-US" dirty="0"/>
+          </a:p>
+        </p:txBody>
+      </p:sp>
+      <p:sp>
+        <p:nvSpPr>
+          <p:cNvPr id="3" name="Slide Number Placeholder 2"/>
+          <p:cNvSpPr>
+            <a:spLocks noGrp="1"/>
+          </p:cNvSpPr>
+          <p:nvPr>
+            <p:ph type="sldNum" sz="quarter" idx="12"/>
+          </p:nvPr>
+        </p:nvSpPr>
+        <p:spPr/>
+        <p:txBody>
+          <a:bodyPr/>
+          <a:lstStyle/>
+          <a:p>
+            <a:fld id="{44B534F3-EDBB-4952-9E24-9629D31653E6}" type="slidenum">
+              <a:rPr lang="en-US" smtClean="0"/>
+              <a:t>10</a:t>
+            </a:fld>
+            <a:endParaRPr lang="en-US"/>
           </a:p>
         </p:txBody>
       </p:sp>
@@ -3677,7 +4166,7 @@
         </p:blipFill>
         <p:spPr>
           <a:xfrm>
-            <a:off x="8235351" y="6140937"/>
+            <a:off x="7745157" y="6140937"/>
             <a:ext cx="3358551" cy="717063"/>
           </a:xfrm>
           <a:prstGeom prst="rect">
@@ -3787,6 +4276,29 @@
               <a:t>Shark</a:t>
             </a:r>
             <a:endParaRPr lang="en-US" dirty="0"/>
+          </a:p>
+        </p:txBody>
+      </p:sp>
+      <p:sp>
+        <p:nvSpPr>
+          <p:cNvPr id="3" name="Slide Number Placeholder 2"/>
+          <p:cNvSpPr>
+            <a:spLocks noGrp="1"/>
+          </p:cNvSpPr>
+          <p:nvPr>
+            <p:ph type="sldNum" sz="quarter" idx="12"/>
+          </p:nvPr>
+        </p:nvSpPr>
+        <p:spPr/>
+        <p:txBody>
+          <a:bodyPr/>
+          <a:lstStyle/>
+          <a:p>
+            <a:fld id="{44B534F3-EDBB-4952-9E24-9629D31653E6}" type="slidenum">
+              <a:rPr lang="en-US" smtClean="0"/>
+              <a:t>11</a:t>
+            </a:fld>
+            <a:endParaRPr lang="en-US"/>
           </a:p>
         </p:txBody>
       </p:sp>
@@ -3974,7 +4486,7 @@
         </p:blipFill>
         <p:spPr>
           <a:xfrm>
-            <a:off x="8235351" y="6140937"/>
+            <a:off x="7782864" y="6140937"/>
             <a:ext cx="3358551" cy="717063"/>
           </a:xfrm>
           <a:prstGeom prst="rect">
@@ -4084,6 +4596,29 @@
               <a:t>Shark</a:t>
             </a:r>
             <a:endParaRPr lang="en-US" dirty="0"/>
+          </a:p>
+        </p:txBody>
+      </p:sp>
+      <p:sp>
+        <p:nvSpPr>
+          <p:cNvPr id="3" name="Slide Number Placeholder 2"/>
+          <p:cNvSpPr>
+            <a:spLocks noGrp="1"/>
+          </p:cNvSpPr>
+          <p:nvPr>
+            <p:ph type="sldNum" sz="quarter" idx="12"/>
+          </p:nvPr>
+        </p:nvSpPr>
+        <p:spPr/>
+        <p:txBody>
+          <a:bodyPr/>
+          <a:lstStyle/>
+          <a:p>
+            <a:fld id="{44B534F3-EDBB-4952-9E24-9629D31653E6}" type="slidenum">
+              <a:rPr lang="en-US" smtClean="0"/>
+              <a:t>12</a:t>
+            </a:fld>
+            <a:endParaRPr lang="en-US"/>
           </a:p>
         </p:txBody>
       </p:sp>
@@ -4189,6 +4724,29 @@
           </a:prstGeom>
         </p:spPr>
       </p:pic>
+      <p:sp>
+        <p:nvSpPr>
+          <p:cNvPr id="2" name="Slide Number Placeholder 1"/>
+          <p:cNvSpPr>
+            <a:spLocks noGrp="1"/>
+          </p:cNvSpPr>
+          <p:nvPr>
+            <p:ph type="sldNum" sz="quarter" idx="12"/>
+          </p:nvPr>
+        </p:nvSpPr>
+        <p:spPr/>
+        <p:txBody>
+          <a:bodyPr/>
+          <a:lstStyle/>
+          <a:p>
+            <a:fld id="{44B534F3-EDBB-4952-9E24-9629D31653E6}" type="slidenum">
+              <a:rPr lang="en-US" smtClean="0"/>
+              <a:t>13</a:t>
+            </a:fld>
+            <a:endParaRPr lang="en-US"/>
+          </a:p>
+        </p:txBody>
+      </p:sp>
     </p:spTree>
     <p:extLst>
       <p:ext uri="{BB962C8B-B14F-4D97-AF65-F5344CB8AC3E}">
@@ -4366,14 +4924,14 @@
           <p:nvPr/>
         </p:nvPicPr>
         <p:blipFill>
-          <a:blip r:embed="rId2"/>
+          <a:blip r:embed="rId3"/>
           <a:stretch>
             <a:fillRect/>
           </a:stretch>
         </p:blipFill>
         <p:spPr>
           <a:xfrm>
-            <a:off x="8235351" y="6140937"/>
+            <a:off x="8153178" y="6140937"/>
             <a:ext cx="3358551" cy="717063"/>
           </a:xfrm>
           <a:prstGeom prst="rect">
@@ -4508,7 +5066,7 @@
           <a:p>
             <a:pPr marL="285750" indent="-285750">
               <a:buBlip>
-                <a:blip r:embed="rId3"/>
+                <a:blip r:embed="rId4"/>
               </a:buBlip>
             </a:pPr>
             <a:endParaRPr lang="en-US" sz="2400" dirty="0"/>
@@ -4581,7 +5139,7 @@
               </a:lnSpc>
               <a:buSzPct val="120000"/>
               <a:buBlip>
-                <a:blip r:embed="rId3"/>
+                <a:blip r:embed="rId4"/>
               </a:buBlip>
             </a:pPr>
             <a:r>
@@ -4596,7 +5154,7 @@
               </a:lnSpc>
               <a:buSzPct val="120000"/>
               <a:buBlip>
-                <a:blip r:embed="rId3"/>
+                <a:blip r:embed="rId4"/>
               </a:buBlip>
             </a:pPr>
             <a:r>
@@ -4611,7 +5169,7 @@
               </a:lnSpc>
               <a:buSzPct val="120000"/>
               <a:buBlip>
-                <a:blip r:embed="rId3"/>
+                <a:blip r:embed="rId4"/>
               </a:buBlip>
             </a:pPr>
             <a:r>
@@ -4626,7 +5184,7 @@
               </a:lnSpc>
               <a:buSzPct val="120000"/>
               <a:buBlip>
-                <a:blip r:embed="rId3"/>
+                <a:blip r:embed="rId4"/>
               </a:buBlip>
             </a:pPr>
             <a:r>
@@ -4641,7 +5199,7 @@
               </a:lnSpc>
               <a:buSzPct val="120000"/>
               <a:buBlip>
-                <a:blip r:embed="rId3"/>
+                <a:blip r:embed="rId4"/>
               </a:buBlip>
             </a:pPr>
             <a:r>
@@ -4656,7 +5214,7 @@
               </a:lnSpc>
               <a:buSzPct val="120000"/>
               <a:buBlip>
-                <a:blip r:embed="rId3"/>
+                <a:blip r:embed="rId4"/>
               </a:buBlip>
             </a:pPr>
             <a:r>
@@ -4671,7 +5229,7 @@
               </a:lnSpc>
               <a:buSzPct val="120000"/>
               <a:buBlip>
-                <a:blip r:embed="rId3"/>
+                <a:blip r:embed="rId4"/>
               </a:buBlip>
             </a:pPr>
             <a:r>
@@ -4686,7 +5244,7 @@
               </a:lnSpc>
               <a:buSzPct val="120000"/>
               <a:buBlip>
-                <a:blip r:embed="rId3"/>
+                <a:blip r:embed="rId4"/>
               </a:buBlip>
             </a:pPr>
             <a:r>
@@ -4701,7 +5259,7 @@
               </a:lnSpc>
               <a:buSzPct val="120000"/>
               <a:buBlip>
-                <a:blip r:embed="rId3"/>
+                <a:blip r:embed="rId4"/>
               </a:buBlip>
             </a:pPr>
             <a:r>
@@ -4716,7 +5274,7 @@
               </a:lnSpc>
               <a:buSzPct val="120000"/>
               <a:buBlip>
-                <a:blip r:embed="rId3"/>
+                <a:blip r:embed="rId4"/>
               </a:buBlip>
             </a:pPr>
             <a:r>
@@ -4731,7 +5289,7 @@
               </a:lnSpc>
               <a:buSzPct val="120000"/>
               <a:buBlip>
-                <a:blip r:embed="rId3"/>
+                <a:blip r:embed="rId4"/>
               </a:buBlip>
             </a:pPr>
             <a:r>
@@ -4746,13 +5304,41 @@
               </a:lnSpc>
               <a:buSzPct val="120000"/>
               <a:buBlip>
-                <a:blip r:embed="rId3"/>
+                <a:blip r:embed="rId4"/>
               </a:buBlip>
             </a:pPr>
             <a:r>
               <a:rPr lang="en-US" dirty="0" smtClean="0"/>
               <a:t>Conclusion</a:t>
             </a:r>
+          </a:p>
+        </p:txBody>
+      </p:sp>
+      <p:sp>
+        <p:nvSpPr>
+          <p:cNvPr id="5" name="Slide Number Placeholder 4"/>
+          <p:cNvSpPr>
+            <a:spLocks noGrp="1"/>
+          </p:cNvSpPr>
+          <p:nvPr>
+            <p:ph type="sldNum" sz="quarter" idx="12"/>
+          </p:nvPr>
+        </p:nvSpPr>
+        <p:spPr>
+          <a:xfrm>
+            <a:off x="8968595" y="6404305"/>
+            <a:ext cx="2743200" cy="365125"/>
+          </a:xfrm>
+        </p:spPr>
+        <p:txBody>
+          <a:bodyPr/>
+          <a:lstStyle/>
+          <a:p>
+            <a:fld id="{44B534F3-EDBB-4952-9E24-9629D31653E6}" type="slidenum">
+              <a:rPr lang="en-US" smtClean="0"/>
+              <a:t>2</a:t>
+            </a:fld>
+            <a:endParaRPr lang="en-US" dirty="0"/>
           </a:p>
         </p:txBody>
       </p:sp>
@@ -4940,7 +5526,7 @@
         </p:blipFill>
         <p:spPr>
           <a:xfrm>
-            <a:off x="8235351" y="6140937"/>
+            <a:off x="7795404" y="6140937"/>
             <a:ext cx="3358551" cy="717063"/>
           </a:xfrm>
           <a:prstGeom prst="rect">
@@ -5043,40 +5629,837 @@
       </p:pic>
       <p:sp>
         <p:nvSpPr>
-          <p:cNvPr id="5" name="TextBox 4"/>
-          <p:cNvSpPr txBox="1"/>
-          <p:nvPr/>
-        </p:nvSpPr>
-        <p:spPr>
-          <a:xfrm>
-            <a:off x="4692770" y="638355"/>
-            <a:ext cx="4028536" cy="646331"/>
-          </a:xfrm>
-          <a:prstGeom prst="rect">
-            <a:avLst/>
-          </a:prstGeom>
-          <a:noFill/>
-        </p:spPr>
-        <p:txBody>
-          <a:bodyPr wrap="square" rtlCol="0">
-            <a:spAutoFit/>
-          </a:bodyPr>
-          <a:lstStyle/>
-          <a:p>
-            <a:pPr marL="342900" indent="-342900">
-              <a:buSzPct val="150000"/>
-              <a:buBlip>
-                <a:blip r:embed="rId5"/>
-              </a:buBlip>
-            </a:pPr>
-            <a:r>
-              <a:rPr lang="en-US" dirty="0" smtClean="0"/>
-              <a:t>Shark Share Global was founded by Madeline Green and Lauren Meyer</a:t>
-            </a:r>
+          <p:cNvPr id="3" name="Slide Number Placeholder 2"/>
+          <p:cNvSpPr>
+            <a:spLocks noGrp="1"/>
+          </p:cNvSpPr>
+          <p:nvPr>
+            <p:ph type="sldNum" sz="quarter" idx="12"/>
+          </p:nvPr>
+        </p:nvSpPr>
+        <p:spPr/>
+        <p:txBody>
+          <a:bodyPr/>
+          <a:lstStyle/>
+          <a:p>
+            <a:fld id="{44B534F3-EDBB-4952-9E24-9629D31653E6}" type="slidenum">
+              <a:rPr lang="en-US" smtClean="0"/>
+              <a:t>3</a:t>
+            </a:fld>
             <a:endParaRPr lang="en-US" dirty="0"/>
           </a:p>
         </p:txBody>
       </p:sp>
+      <p:grpSp>
+        <p:nvGrpSpPr>
+          <p:cNvPr id="15" name="Group 14"/>
+          <p:cNvGrpSpPr/>
+          <p:nvPr/>
+        </p:nvGrpSpPr>
+        <p:grpSpPr>
+          <a:xfrm>
+            <a:off x="7912260" y="115472"/>
+            <a:ext cx="4139880" cy="3235322"/>
+            <a:chOff x="4232635" y="641173"/>
+            <a:chExt cx="4139880" cy="3235322"/>
+          </a:xfrm>
+        </p:grpSpPr>
+        <p:sp>
+          <p:nvSpPr>
+            <p:cNvPr id="5" name="TextBox 4"/>
+            <p:cNvSpPr txBox="1"/>
+            <p:nvPr/>
+          </p:nvSpPr>
+          <p:spPr>
+            <a:xfrm>
+              <a:off x="4288307" y="1068728"/>
+              <a:ext cx="4028536" cy="2807767"/>
+            </a:xfrm>
+            <a:prstGeom prst="rect">
+              <a:avLst/>
+            </a:prstGeom>
+            <a:noFill/>
+          </p:spPr>
+          <p:txBody>
+            <a:bodyPr wrap="square" rtlCol="0">
+              <a:spAutoFit/>
+            </a:bodyPr>
+            <a:lstStyle/>
+            <a:p>
+              <a:pPr marL="342900" indent="-342900">
+                <a:buSzPct val="150000"/>
+                <a:buBlip>
+                  <a:blip r:embed="rId5"/>
+                </a:buBlip>
+              </a:pPr>
+              <a:r>
+                <a:rPr lang="en-US" dirty="0" smtClean="0"/>
+                <a:t>Shark Share Global was founded by Madeline Green and Lauren </a:t>
+              </a:r>
+              <a:r>
+                <a:rPr lang="en-US" dirty="0" smtClean="0"/>
+                <a:t>Meyer,</a:t>
+              </a:r>
+              <a:r>
+                <a:rPr lang="en-US" dirty="0"/>
+                <a:t> </a:t>
+              </a:r>
+              <a:r>
+                <a:rPr lang="en-US" dirty="0" smtClean="0"/>
+                <a:t>PhD students…</a:t>
+              </a:r>
+              <a:endParaRPr lang="en-US" dirty="0"/>
+            </a:p>
+          </p:txBody>
+        </p:sp>
+        <p:sp>
+          <p:nvSpPr>
+            <p:cNvPr id="10" name="Rounded Rectangle 9"/>
+            <p:cNvSpPr/>
+            <p:nvPr/>
+          </p:nvSpPr>
+          <p:spPr>
+            <a:xfrm>
+              <a:off x="4232635" y="641173"/>
+              <a:ext cx="4139880" cy="3127600"/>
+            </a:xfrm>
+            <a:prstGeom prst="roundRect">
+              <a:avLst/>
+            </a:prstGeom>
+            <a:noFill/>
+            <a:ln w="38100">
+              <a:solidFill>
+                <a:srgbClr val="001641"/>
+              </a:solidFill>
+            </a:ln>
+          </p:spPr>
+          <p:style>
+            <a:lnRef idx="2">
+              <a:schemeClr val="accent1">
+                <a:shade val="50000"/>
+              </a:schemeClr>
+            </a:lnRef>
+            <a:fillRef idx="1">
+              <a:schemeClr val="accent1"/>
+            </a:fillRef>
+            <a:effectRef idx="0">
+              <a:schemeClr val="accent1"/>
+            </a:effectRef>
+            <a:fontRef idx="minor">
+              <a:schemeClr val="lt1"/>
+            </a:fontRef>
+          </p:style>
+          <p:txBody>
+            <a:bodyPr rtlCol="0" anchor="ctr"/>
+            <a:lstStyle/>
+            <a:p>
+              <a:pPr algn="ctr"/>
+              <a:endParaRPr lang="en-US"/>
+            </a:p>
+          </p:txBody>
+        </p:sp>
+        <p:sp>
+          <p:nvSpPr>
+            <p:cNvPr id="13" name="TextBox 12"/>
+            <p:cNvSpPr txBox="1"/>
+            <p:nvPr/>
+          </p:nvSpPr>
+          <p:spPr>
+            <a:xfrm>
+              <a:off x="4703975" y="748895"/>
+              <a:ext cx="3091429" cy="400110"/>
+            </a:xfrm>
+            <a:prstGeom prst="rect">
+              <a:avLst/>
+            </a:prstGeom>
+            <a:noFill/>
+          </p:spPr>
+          <p:txBody>
+            <a:bodyPr wrap="square" rtlCol="0">
+              <a:spAutoFit/>
+            </a:bodyPr>
+            <a:lstStyle/>
+            <a:p>
+              <a:r>
+                <a:rPr lang="en-US" sz="2000" b="1" dirty="0" smtClean="0"/>
+                <a:t>Founders</a:t>
+              </a:r>
+              <a:endParaRPr lang="en-US" sz="2000" b="1" dirty="0"/>
+            </a:p>
+          </p:txBody>
+        </p:sp>
+      </p:grpSp>
+      <p:grpSp>
+        <p:nvGrpSpPr>
+          <p:cNvPr id="19" name="Group 18"/>
+          <p:cNvGrpSpPr/>
+          <p:nvPr/>
+        </p:nvGrpSpPr>
+        <p:grpSpPr>
+          <a:xfrm>
+            <a:off x="4157132" y="140025"/>
+            <a:ext cx="3289361" cy="2481365"/>
+            <a:chOff x="4096250" y="1006301"/>
+            <a:chExt cx="3490482" cy="2754994"/>
+          </a:xfrm>
+        </p:grpSpPr>
+        <p:sp>
+          <p:nvSpPr>
+            <p:cNvPr id="16" name="TextBox 15"/>
+            <p:cNvSpPr txBox="1"/>
+            <p:nvPr/>
+          </p:nvSpPr>
+          <p:spPr>
+            <a:xfrm>
+              <a:off x="4411744" y="1084082"/>
+              <a:ext cx="2432116" cy="400110"/>
+            </a:xfrm>
+            <a:prstGeom prst="rect">
+              <a:avLst/>
+            </a:prstGeom>
+            <a:noFill/>
+          </p:spPr>
+          <p:txBody>
+            <a:bodyPr wrap="square" rtlCol="0">
+              <a:spAutoFit/>
+            </a:bodyPr>
+            <a:lstStyle/>
+            <a:p>
+              <a:r>
+                <a:rPr lang="en-US" sz="2000" b="1" dirty="0" smtClean="0"/>
+                <a:t>Mission</a:t>
+              </a:r>
+              <a:endParaRPr lang="en-US" b="1" dirty="0"/>
+            </a:p>
+          </p:txBody>
+        </p:sp>
+        <p:sp>
+          <p:nvSpPr>
+            <p:cNvPr id="17" name="TextBox 16"/>
+            <p:cNvSpPr txBox="1"/>
+            <p:nvPr/>
+          </p:nvSpPr>
+          <p:spPr>
+            <a:xfrm>
+              <a:off x="4304922" y="1453414"/>
+              <a:ext cx="3073138" cy="1200329"/>
+            </a:xfrm>
+            <a:prstGeom prst="rect">
+              <a:avLst/>
+            </a:prstGeom>
+            <a:noFill/>
+          </p:spPr>
+          <p:txBody>
+            <a:bodyPr wrap="square" rtlCol="0">
+              <a:spAutoFit/>
+            </a:bodyPr>
+            <a:lstStyle/>
+            <a:p>
+              <a:pPr marL="342900" indent="-342900">
+                <a:buSzPct val="150000"/>
+                <a:buBlip>
+                  <a:blip r:embed="rId5"/>
+                </a:buBlip>
+              </a:pPr>
+              <a:r>
+                <a:rPr lang="en-US" dirty="0" smtClean="0"/>
+                <a:t>Shark Share </a:t>
+              </a:r>
+              <a:r>
+                <a:rPr lang="en-US" dirty="0" err="1" smtClean="0"/>
+                <a:t>Global’s</a:t>
+              </a:r>
+              <a:r>
+                <a:rPr lang="en-US" dirty="0" smtClean="0"/>
+                <a:t> mission is to create a paradigm shift for shark and ray researchers….</a:t>
+              </a:r>
+              <a:endParaRPr lang="en-US" dirty="0"/>
+            </a:p>
+          </p:txBody>
+        </p:sp>
+        <p:sp>
+          <p:nvSpPr>
+            <p:cNvPr id="18" name="Rounded Rectangle 17"/>
+            <p:cNvSpPr/>
+            <p:nvPr/>
+          </p:nvSpPr>
+          <p:spPr>
+            <a:xfrm>
+              <a:off x="4096250" y="1006301"/>
+              <a:ext cx="3490482" cy="2754994"/>
+            </a:xfrm>
+            <a:prstGeom prst="roundRect">
+              <a:avLst/>
+            </a:prstGeom>
+            <a:noFill/>
+            <a:ln w="38100">
+              <a:solidFill>
+                <a:srgbClr val="0088CE"/>
+              </a:solidFill>
+            </a:ln>
+          </p:spPr>
+          <p:style>
+            <a:lnRef idx="2">
+              <a:schemeClr val="accent1">
+                <a:shade val="50000"/>
+              </a:schemeClr>
+            </a:lnRef>
+            <a:fillRef idx="1">
+              <a:schemeClr val="accent1"/>
+            </a:fillRef>
+            <a:effectRef idx="0">
+              <a:schemeClr val="accent1"/>
+            </a:effectRef>
+            <a:fontRef idx="minor">
+              <a:schemeClr val="lt1"/>
+            </a:fontRef>
+          </p:style>
+          <p:txBody>
+            <a:bodyPr rtlCol="0" anchor="ctr"/>
+            <a:lstStyle/>
+            <a:p>
+              <a:pPr algn="ctr"/>
+              <a:endParaRPr lang="en-US"/>
+            </a:p>
+          </p:txBody>
+        </p:sp>
+      </p:grpSp>
+      <p:grpSp>
+        <p:nvGrpSpPr>
+          <p:cNvPr id="28" name="Group 27"/>
+          <p:cNvGrpSpPr/>
+          <p:nvPr/>
+        </p:nvGrpSpPr>
+        <p:grpSpPr>
+          <a:xfrm>
+            <a:off x="8088198" y="3397904"/>
+            <a:ext cx="4967233" cy="2418846"/>
+            <a:chOff x="8088198" y="3397904"/>
+            <a:chExt cx="4967233" cy="2418846"/>
+          </a:xfrm>
+        </p:grpSpPr>
+        <p:grpSp>
+          <p:nvGrpSpPr>
+            <p:cNvPr id="26" name="Group 25"/>
+            <p:cNvGrpSpPr/>
+            <p:nvPr/>
+          </p:nvGrpSpPr>
+          <p:grpSpPr>
+            <a:xfrm>
+              <a:off x="8088198" y="3397904"/>
+              <a:ext cx="3908270" cy="2310103"/>
+              <a:chOff x="8088198" y="3968685"/>
+              <a:chExt cx="3908270" cy="2310103"/>
+            </a:xfrm>
+          </p:grpSpPr>
+          <p:pic>
+            <p:nvPicPr>
+              <p:cNvPr id="20" name="Picture 19"/>
+              <p:cNvPicPr>
+                <a:picLocks noChangeAspect="1"/>
+              </p:cNvPicPr>
+              <p:nvPr/>
+            </p:nvPicPr>
+            <p:blipFill>
+              <a:blip r:embed="rId6">
+                <a:extLst>
+                  <a:ext uri="{28A0092B-C50C-407E-A947-70E740481C1C}">
+                    <a14:useLocalDpi xmlns:a14="http://schemas.microsoft.com/office/drawing/2010/main" val="0"/>
+                  </a:ext>
+                </a:extLst>
+              </a:blip>
+              <a:stretch>
+                <a:fillRect/>
+              </a:stretch>
+            </p:blipFill>
+            <p:spPr>
+              <a:xfrm>
+                <a:off x="8462731" y="4464442"/>
+                <a:ext cx="1814346" cy="1814346"/>
+              </a:xfrm>
+              <a:prstGeom prst="rect">
+                <a:avLst/>
+              </a:prstGeom>
+            </p:spPr>
+          </p:pic>
+          <p:grpSp>
+            <p:nvGrpSpPr>
+              <p:cNvPr id="25" name="Group 24"/>
+              <p:cNvGrpSpPr/>
+              <p:nvPr/>
+            </p:nvGrpSpPr>
+            <p:grpSpPr>
+              <a:xfrm>
+                <a:off x="8088198" y="3968685"/>
+                <a:ext cx="3908270" cy="2232540"/>
+                <a:chOff x="8088198" y="3968685"/>
+                <a:chExt cx="3908270" cy="2232540"/>
+              </a:xfrm>
+            </p:grpSpPr>
+            <p:pic>
+              <p:nvPicPr>
+                <p:cNvPr id="21" name="Picture 20"/>
+                <p:cNvPicPr>
+                  <a:picLocks noChangeAspect="1"/>
+                </p:cNvPicPr>
+                <p:nvPr/>
+              </p:nvPicPr>
+              <p:blipFill>
+                <a:blip r:embed="rId7">
+                  <a:extLst>
+                    <a:ext uri="{28A0092B-C50C-407E-A947-70E740481C1C}">
+                      <a14:useLocalDpi xmlns:a14="http://schemas.microsoft.com/office/drawing/2010/main" val="0"/>
+                    </a:ext>
+                  </a:extLst>
+                </a:blip>
+                <a:stretch>
+                  <a:fillRect/>
+                </a:stretch>
+              </p:blipFill>
+              <p:spPr>
+                <a:xfrm>
+                  <a:off x="10229525" y="4434282"/>
+                  <a:ext cx="1766943" cy="1766943"/>
+                </a:xfrm>
+                <a:prstGeom prst="rect">
+                  <a:avLst/>
+                </a:prstGeom>
+              </p:spPr>
+            </p:pic>
+            <p:sp>
+              <p:nvSpPr>
+                <p:cNvPr id="22" name="Rounded Rectangle 21"/>
+                <p:cNvSpPr/>
+                <p:nvPr/>
+              </p:nvSpPr>
+              <p:spPr>
+                <a:xfrm>
+                  <a:off x="8088198" y="3968685"/>
+                  <a:ext cx="3908270" cy="2232540"/>
+                </a:xfrm>
+                <a:prstGeom prst="roundRect">
+                  <a:avLst/>
+                </a:prstGeom>
+                <a:noFill/>
+                <a:ln w="38100">
+                  <a:solidFill>
+                    <a:srgbClr val="0088CE"/>
+                  </a:solidFill>
+                </a:ln>
+              </p:spPr>
+              <p:style>
+                <a:lnRef idx="2">
+                  <a:schemeClr val="accent1">
+                    <a:shade val="50000"/>
+                  </a:schemeClr>
+                </a:lnRef>
+                <a:fillRef idx="1">
+                  <a:schemeClr val="accent1"/>
+                </a:fillRef>
+                <a:effectRef idx="0">
+                  <a:schemeClr val="accent1"/>
+                </a:effectRef>
+                <a:fontRef idx="minor">
+                  <a:schemeClr val="lt1"/>
+                </a:fontRef>
+              </p:style>
+              <p:txBody>
+                <a:bodyPr rtlCol="0" anchor="ctr"/>
+                <a:lstStyle/>
+                <a:p>
+                  <a:pPr algn="ctr"/>
+                  <a:endParaRPr lang="en-US"/>
+                </a:p>
+              </p:txBody>
+            </p:sp>
+            <p:sp>
+              <p:nvSpPr>
+                <p:cNvPr id="23" name="TextBox 22"/>
+                <p:cNvSpPr txBox="1"/>
+                <p:nvPr/>
+              </p:nvSpPr>
+              <p:spPr>
+                <a:xfrm>
+                  <a:off x="11309831" y="4854122"/>
+                  <a:ext cx="626047" cy="461665"/>
+                </a:xfrm>
+                <a:prstGeom prst="rect">
+                  <a:avLst/>
+                </a:prstGeom>
+                <a:noFill/>
+              </p:spPr>
+              <p:txBody>
+                <a:bodyPr wrap="square" rtlCol="0">
+                  <a:spAutoFit/>
+                </a:bodyPr>
+                <a:lstStyle/>
+                <a:p>
+                  <a:pPr algn="r"/>
+                  <a:r>
+                    <a:rPr lang="en-US" sz="1200" dirty="0" smtClean="0"/>
+                    <a:t>Lauren Meyer</a:t>
+                  </a:r>
+                  <a:endParaRPr lang="en-US" sz="1200" dirty="0"/>
+                </a:p>
+              </p:txBody>
+            </p:sp>
+            <p:sp>
+              <p:nvSpPr>
+                <p:cNvPr id="24" name="TextBox 23"/>
+                <p:cNvSpPr txBox="1"/>
+                <p:nvPr/>
+              </p:nvSpPr>
+              <p:spPr>
+                <a:xfrm>
+                  <a:off x="8088198" y="5292213"/>
+                  <a:ext cx="850966" cy="461665"/>
+                </a:xfrm>
+                <a:prstGeom prst="rect">
+                  <a:avLst/>
+                </a:prstGeom>
+                <a:noFill/>
+              </p:spPr>
+              <p:txBody>
+                <a:bodyPr wrap="square" rtlCol="0">
+                  <a:spAutoFit/>
+                </a:bodyPr>
+                <a:lstStyle/>
+                <a:p>
+                  <a:r>
+                    <a:rPr lang="en-US" sz="1200" dirty="0" smtClean="0"/>
+                    <a:t>Madeline Green</a:t>
+                  </a:r>
+                  <a:endParaRPr lang="en-US" sz="1200" dirty="0"/>
+                </a:p>
+              </p:txBody>
+            </p:sp>
+          </p:grpSp>
+        </p:grpSp>
+        <p:sp>
+          <p:nvSpPr>
+            <p:cNvPr id="27" name="TextBox 26"/>
+            <p:cNvSpPr txBox="1"/>
+            <p:nvPr/>
+          </p:nvSpPr>
+          <p:spPr>
+            <a:xfrm>
+              <a:off x="8173040" y="5601306"/>
+              <a:ext cx="4882391" cy="215444"/>
+            </a:xfrm>
+            <a:prstGeom prst="rect">
+              <a:avLst/>
+            </a:prstGeom>
+            <a:noFill/>
+          </p:spPr>
+          <p:txBody>
+            <a:bodyPr wrap="square" rtlCol="0">
+              <a:spAutoFit/>
+            </a:bodyPr>
+            <a:lstStyle/>
+            <a:p>
+              <a:r>
+                <a:rPr lang="en-US" sz="800" dirty="0" smtClean="0">
+                  <a:solidFill>
+                    <a:schemeClr val="bg2">
+                      <a:lumMod val="50000"/>
+                    </a:schemeClr>
+                  </a:solidFill>
+                </a:rPr>
+                <a:t>Photo credit: Save Our Seas Foundation saveourseas.com/project/shark-share-global/</a:t>
+              </a:r>
+              <a:endParaRPr lang="en-US" sz="800" dirty="0">
+                <a:solidFill>
+                  <a:schemeClr val="bg2">
+                    <a:lumMod val="50000"/>
+                  </a:schemeClr>
+                </a:solidFill>
+              </a:endParaRPr>
+            </a:p>
+          </p:txBody>
+        </p:sp>
+      </p:grpSp>
+      <p:grpSp>
+        <p:nvGrpSpPr>
+          <p:cNvPr id="33" name="Group 32"/>
+          <p:cNvGrpSpPr/>
+          <p:nvPr/>
+        </p:nvGrpSpPr>
+        <p:grpSpPr>
+          <a:xfrm>
+            <a:off x="4157132" y="2736997"/>
+            <a:ext cx="3289361" cy="2446100"/>
+            <a:chOff x="4512930" y="3110845"/>
+            <a:chExt cx="2736914" cy="2253007"/>
+          </a:xfrm>
+        </p:grpSpPr>
+        <p:sp>
+          <p:nvSpPr>
+            <p:cNvPr id="29" name="TextBox 28"/>
+            <p:cNvSpPr txBox="1"/>
+            <p:nvPr/>
+          </p:nvSpPr>
+          <p:spPr>
+            <a:xfrm>
+              <a:off x="4609707" y="3243072"/>
+              <a:ext cx="2554664" cy="367394"/>
+            </a:xfrm>
+            <a:prstGeom prst="rect">
+              <a:avLst/>
+            </a:prstGeom>
+            <a:noFill/>
+          </p:spPr>
+          <p:txBody>
+            <a:bodyPr wrap="square" rtlCol="0">
+              <a:spAutoFit/>
+            </a:bodyPr>
+            <a:lstStyle/>
+            <a:p>
+              <a:r>
+                <a:rPr lang="en-US" sz="2000" b="1" dirty="0" smtClean="0"/>
+                <a:t>Community Support</a:t>
+              </a:r>
+              <a:endParaRPr lang="en-US" sz="2000" b="1" dirty="0"/>
+            </a:p>
+          </p:txBody>
+        </p:sp>
+        <p:sp>
+          <p:nvSpPr>
+            <p:cNvPr id="30" name="Rectangle 29"/>
+            <p:cNvSpPr/>
+            <p:nvPr/>
+          </p:nvSpPr>
+          <p:spPr>
+            <a:xfrm>
+              <a:off x="4512930" y="3610466"/>
+              <a:ext cx="2494961" cy="1200329"/>
+            </a:xfrm>
+            <a:prstGeom prst="rect">
+              <a:avLst/>
+            </a:prstGeom>
+          </p:spPr>
+          <p:txBody>
+            <a:bodyPr wrap="square">
+              <a:spAutoFit/>
+            </a:bodyPr>
+            <a:lstStyle/>
+            <a:p>
+              <a:pPr marL="342900" indent="-342900">
+                <a:buSzPct val="150000"/>
+                <a:buBlip>
+                  <a:blip r:embed="rId5"/>
+                </a:buBlip>
+              </a:pPr>
+              <a:r>
+                <a:rPr lang="en-US" dirty="0" smtClean="0"/>
+                <a:t>The database is surrounded by a healthy community….</a:t>
+              </a:r>
+              <a:endParaRPr lang="en-US" dirty="0"/>
+            </a:p>
+          </p:txBody>
+        </p:sp>
+        <p:sp>
+          <p:nvSpPr>
+            <p:cNvPr id="32" name="Rounded Rectangle 31"/>
+            <p:cNvSpPr/>
+            <p:nvPr/>
+          </p:nvSpPr>
+          <p:spPr>
+            <a:xfrm>
+              <a:off x="4512930" y="3110845"/>
+              <a:ext cx="2736914" cy="2253007"/>
+            </a:xfrm>
+            <a:prstGeom prst="roundRect">
+              <a:avLst/>
+            </a:prstGeom>
+            <a:noFill/>
+            <a:ln w="38100">
+              <a:solidFill>
+                <a:srgbClr val="001641"/>
+              </a:solidFill>
+            </a:ln>
+          </p:spPr>
+          <p:style>
+            <a:lnRef idx="2">
+              <a:schemeClr val="accent1">
+                <a:shade val="50000"/>
+              </a:schemeClr>
+            </a:lnRef>
+            <a:fillRef idx="1">
+              <a:schemeClr val="accent1"/>
+            </a:fillRef>
+            <a:effectRef idx="0">
+              <a:schemeClr val="accent1"/>
+            </a:effectRef>
+            <a:fontRef idx="minor">
+              <a:schemeClr val="lt1"/>
+            </a:fontRef>
+          </p:style>
+          <p:txBody>
+            <a:bodyPr rtlCol="0" anchor="ctr"/>
+            <a:lstStyle/>
+            <a:p>
+              <a:pPr algn="ctr"/>
+              <a:endParaRPr lang="en-US"/>
+            </a:p>
+          </p:txBody>
+        </p:sp>
+      </p:grpSp>
+      <p:grpSp>
+        <p:nvGrpSpPr>
+          <p:cNvPr id="38" name="Group 37"/>
+          <p:cNvGrpSpPr/>
+          <p:nvPr/>
+        </p:nvGrpSpPr>
+        <p:grpSpPr>
+          <a:xfrm>
+            <a:off x="534939" y="3761295"/>
+            <a:ext cx="3331402" cy="2053600"/>
+            <a:chOff x="569344" y="4106913"/>
+            <a:chExt cx="3331402" cy="2053600"/>
+          </a:xfrm>
+        </p:grpSpPr>
+        <p:sp>
+          <p:nvSpPr>
+            <p:cNvPr id="34" name="TextBox 33"/>
+            <p:cNvSpPr txBox="1"/>
+            <p:nvPr/>
+          </p:nvSpPr>
+          <p:spPr>
+            <a:xfrm>
+              <a:off x="737080" y="4182303"/>
+              <a:ext cx="2530815" cy="400110"/>
+            </a:xfrm>
+            <a:prstGeom prst="rect">
+              <a:avLst/>
+            </a:prstGeom>
+            <a:noFill/>
+          </p:spPr>
+          <p:txBody>
+            <a:bodyPr wrap="square" rtlCol="0">
+              <a:spAutoFit/>
+            </a:bodyPr>
+            <a:lstStyle/>
+            <a:p>
+              <a:r>
+                <a:rPr lang="en-US" sz="2000" b="1" dirty="0" smtClean="0"/>
+                <a:t>Financial Sponsorship</a:t>
+              </a:r>
+              <a:endParaRPr lang="en-US" sz="2000" b="1" dirty="0"/>
+            </a:p>
+          </p:txBody>
+        </p:sp>
+        <p:sp>
+          <p:nvSpPr>
+            <p:cNvPr id="35" name="Rectangle 34"/>
+            <p:cNvSpPr/>
+            <p:nvPr/>
+          </p:nvSpPr>
+          <p:spPr>
+            <a:xfrm>
+              <a:off x="626929" y="4558707"/>
+              <a:ext cx="3273817" cy="923330"/>
+            </a:xfrm>
+            <a:prstGeom prst="rect">
+              <a:avLst/>
+            </a:prstGeom>
+          </p:spPr>
+          <p:txBody>
+            <a:bodyPr wrap="square">
+              <a:spAutoFit/>
+            </a:bodyPr>
+            <a:lstStyle/>
+            <a:p>
+              <a:pPr marL="342900" indent="-342900">
+                <a:buSzPct val="150000"/>
+                <a:buBlip>
+                  <a:blip r:embed="rId5"/>
+                </a:buBlip>
+              </a:pPr>
+              <a:r>
+                <a:rPr lang="en-US" dirty="0" smtClean="0"/>
+                <a:t>Funding for Shark Share Global is provided by a generous grant from</a:t>
+              </a:r>
+              <a:endParaRPr lang="en-US" dirty="0"/>
+            </a:p>
+          </p:txBody>
+        </p:sp>
+        <p:pic>
+          <p:nvPicPr>
+            <p:cNvPr id="36" name="Picture 35"/>
+            <p:cNvPicPr>
+              <a:picLocks noChangeAspect="1"/>
+            </p:cNvPicPr>
+            <p:nvPr/>
+          </p:nvPicPr>
+          <p:blipFill>
+            <a:blip r:embed="rId8">
+              <a:extLst>
+                <a:ext uri="{28A0092B-C50C-407E-A947-70E740481C1C}">
+                  <a14:useLocalDpi xmlns:a14="http://schemas.microsoft.com/office/drawing/2010/main" val="0"/>
+                </a:ext>
+              </a:extLst>
+            </a:blip>
+            <a:stretch>
+              <a:fillRect/>
+            </a:stretch>
+          </p:blipFill>
+          <p:spPr>
+            <a:xfrm>
+              <a:off x="893862" y="5495925"/>
+              <a:ext cx="2217252" cy="664588"/>
+            </a:xfrm>
+            <a:prstGeom prst="rect">
+              <a:avLst/>
+            </a:prstGeom>
+          </p:spPr>
+        </p:pic>
+        <p:sp>
+          <p:nvSpPr>
+            <p:cNvPr id="37" name="Rounded Rectangle 36"/>
+            <p:cNvSpPr/>
+            <p:nvPr/>
+          </p:nvSpPr>
+          <p:spPr>
+            <a:xfrm>
+              <a:off x="569344" y="4106913"/>
+              <a:ext cx="3182524" cy="2053600"/>
+            </a:xfrm>
+            <a:prstGeom prst="roundRect">
+              <a:avLst/>
+            </a:prstGeom>
+            <a:noFill/>
+            <a:ln w="38100">
+              <a:solidFill>
+                <a:srgbClr val="0088CE"/>
+              </a:solidFill>
+            </a:ln>
+          </p:spPr>
+          <p:style>
+            <a:lnRef idx="2">
+              <a:schemeClr val="accent1">
+                <a:shade val="50000"/>
+              </a:schemeClr>
+            </a:lnRef>
+            <a:fillRef idx="1">
+              <a:schemeClr val="accent1"/>
+            </a:fillRef>
+            <a:effectRef idx="0">
+              <a:schemeClr val="accent1"/>
+            </a:effectRef>
+            <a:fontRef idx="minor">
+              <a:schemeClr val="lt1"/>
+            </a:fontRef>
+          </p:style>
+          <p:txBody>
+            <a:bodyPr rtlCol="0" anchor="ctr"/>
+            <a:lstStyle/>
+            <a:p>
+              <a:pPr algn="ctr"/>
+              <a:endParaRPr lang="en-US"/>
+            </a:p>
+          </p:txBody>
+        </p:sp>
+      </p:grpSp>
     </p:spTree>
     <p:extLst>
       <p:ext uri="{BB962C8B-B14F-4D97-AF65-F5344CB8AC3E}">
@@ -5261,7 +6644,7 @@
         </p:blipFill>
         <p:spPr>
           <a:xfrm>
-            <a:off x="8235351" y="6140937"/>
+            <a:off x="7829999" y="6140937"/>
             <a:ext cx="3358551" cy="717063"/>
           </a:xfrm>
           <a:prstGeom prst="rect">
@@ -5371,6 +6754,29 @@
               <a:t>Shark</a:t>
             </a:r>
             <a:endParaRPr lang="en-US" dirty="0"/>
+          </a:p>
+        </p:txBody>
+      </p:sp>
+      <p:sp>
+        <p:nvSpPr>
+          <p:cNvPr id="3" name="Slide Number Placeholder 2"/>
+          <p:cNvSpPr>
+            <a:spLocks noGrp="1"/>
+          </p:cNvSpPr>
+          <p:nvPr>
+            <p:ph type="sldNum" sz="quarter" idx="12"/>
+          </p:nvPr>
+        </p:nvSpPr>
+        <p:spPr/>
+        <p:txBody>
+          <a:bodyPr/>
+          <a:lstStyle/>
+          <a:p>
+            <a:fld id="{44B534F3-EDBB-4952-9E24-9629D31653E6}" type="slidenum">
+              <a:rPr lang="en-US" smtClean="0"/>
+              <a:t>4</a:t>
+            </a:fld>
+            <a:endParaRPr lang="en-US"/>
           </a:p>
         </p:txBody>
       </p:sp>
@@ -5558,7 +6964,7 @@
         </p:blipFill>
         <p:spPr>
           <a:xfrm>
-            <a:off x="8235351" y="6140937"/>
+            <a:off x="7792291" y="6135015"/>
             <a:ext cx="3358551" cy="717063"/>
           </a:xfrm>
           <a:prstGeom prst="rect">
@@ -5668,6 +7074,29 @@
               <a:t>Shark</a:t>
             </a:r>
             <a:endParaRPr lang="en-US" dirty="0"/>
+          </a:p>
+        </p:txBody>
+      </p:sp>
+      <p:sp>
+        <p:nvSpPr>
+          <p:cNvPr id="3" name="Slide Number Placeholder 2"/>
+          <p:cNvSpPr>
+            <a:spLocks noGrp="1"/>
+          </p:cNvSpPr>
+          <p:nvPr>
+            <p:ph type="sldNum" sz="quarter" idx="12"/>
+          </p:nvPr>
+        </p:nvSpPr>
+        <p:spPr/>
+        <p:txBody>
+          <a:bodyPr/>
+          <a:lstStyle/>
+          <a:p>
+            <a:fld id="{44B534F3-EDBB-4952-9E24-9629D31653E6}" type="slidenum">
+              <a:rPr lang="en-US" smtClean="0"/>
+              <a:t>5</a:t>
+            </a:fld>
+            <a:endParaRPr lang="en-US"/>
           </a:p>
         </p:txBody>
       </p:sp>
@@ -5855,7 +7284,7 @@
         </p:blipFill>
         <p:spPr>
           <a:xfrm>
-            <a:off x="8235351" y="6140937"/>
+            <a:off x="7820572" y="6140937"/>
             <a:ext cx="3358551" cy="717063"/>
           </a:xfrm>
           <a:prstGeom prst="rect">
@@ -5965,6 +7394,29 @@
               <a:t>Shark</a:t>
             </a:r>
             <a:endParaRPr lang="en-US" dirty="0"/>
+          </a:p>
+        </p:txBody>
+      </p:sp>
+      <p:sp>
+        <p:nvSpPr>
+          <p:cNvPr id="3" name="Slide Number Placeholder 2"/>
+          <p:cNvSpPr>
+            <a:spLocks noGrp="1"/>
+          </p:cNvSpPr>
+          <p:nvPr>
+            <p:ph type="sldNum" sz="quarter" idx="12"/>
+          </p:nvPr>
+        </p:nvSpPr>
+        <p:spPr/>
+        <p:txBody>
+          <a:bodyPr/>
+          <a:lstStyle/>
+          <a:p>
+            <a:fld id="{44B534F3-EDBB-4952-9E24-9629D31653E6}" type="slidenum">
+              <a:rPr lang="en-US" smtClean="0"/>
+              <a:t>6</a:t>
+            </a:fld>
+            <a:endParaRPr lang="en-US"/>
           </a:p>
         </p:txBody>
       </p:sp>
@@ -6152,7 +7604,7 @@
         </p:blipFill>
         <p:spPr>
           <a:xfrm>
-            <a:off x="8235351" y="6140937"/>
+            <a:off x="7754584" y="6140937"/>
             <a:ext cx="3358551" cy="717063"/>
           </a:xfrm>
           <a:prstGeom prst="rect">
@@ -6262,6 +7714,29 @@
               <a:t>Shark</a:t>
             </a:r>
             <a:endParaRPr lang="en-US" dirty="0"/>
+          </a:p>
+        </p:txBody>
+      </p:sp>
+      <p:sp>
+        <p:nvSpPr>
+          <p:cNvPr id="3" name="Slide Number Placeholder 2"/>
+          <p:cNvSpPr>
+            <a:spLocks noGrp="1"/>
+          </p:cNvSpPr>
+          <p:nvPr>
+            <p:ph type="sldNum" sz="quarter" idx="12"/>
+          </p:nvPr>
+        </p:nvSpPr>
+        <p:spPr/>
+        <p:txBody>
+          <a:bodyPr/>
+          <a:lstStyle/>
+          <a:p>
+            <a:fld id="{44B534F3-EDBB-4952-9E24-9629D31653E6}" type="slidenum">
+              <a:rPr lang="en-US" smtClean="0"/>
+              <a:t>7</a:t>
+            </a:fld>
+            <a:endParaRPr lang="en-US"/>
           </a:p>
         </p:txBody>
       </p:sp>
@@ -6449,7 +7924,7 @@
         </p:blipFill>
         <p:spPr>
           <a:xfrm>
-            <a:off x="8235351" y="6140937"/>
+            <a:off x="7820571" y="6140937"/>
             <a:ext cx="3358551" cy="717063"/>
           </a:xfrm>
           <a:prstGeom prst="rect">
@@ -6559,6 +8034,29 @@
               <a:t>Shark</a:t>
             </a:r>
             <a:endParaRPr lang="en-US" dirty="0"/>
+          </a:p>
+        </p:txBody>
+      </p:sp>
+      <p:sp>
+        <p:nvSpPr>
+          <p:cNvPr id="3" name="Slide Number Placeholder 2"/>
+          <p:cNvSpPr>
+            <a:spLocks noGrp="1"/>
+          </p:cNvSpPr>
+          <p:nvPr>
+            <p:ph type="sldNum" sz="quarter" idx="12"/>
+          </p:nvPr>
+        </p:nvSpPr>
+        <p:spPr/>
+        <p:txBody>
+          <a:bodyPr/>
+          <a:lstStyle/>
+          <a:p>
+            <a:fld id="{44B534F3-EDBB-4952-9E24-9629D31653E6}" type="slidenum">
+              <a:rPr lang="en-US" smtClean="0"/>
+              <a:t>8</a:t>
+            </a:fld>
+            <a:endParaRPr lang="en-US"/>
           </a:p>
         </p:txBody>
       </p:sp>
@@ -6746,7 +8244,7 @@
         </p:blipFill>
         <p:spPr>
           <a:xfrm>
-            <a:off x="8235351" y="6140937"/>
+            <a:off x="7782864" y="6140937"/>
             <a:ext cx="3358551" cy="717063"/>
           </a:xfrm>
           <a:prstGeom prst="rect">
@@ -6856,6 +8354,29 @@
               <a:t>Shark</a:t>
             </a:r>
             <a:endParaRPr lang="en-US" dirty="0"/>
+          </a:p>
+        </p:txBody>
+      </p:sp>
+      <p:sp>
+        <p:nvSpPr>
+          <p:cNvPr id="3" name="Slide Number Placeholder 2"/>
+          <p:cNvSpPr>
+            <a:spLocks noGrp="1"/>
+          </p:cNvSpPr>
+          <p:nvPr>
+            <p:ph type="sldNum" sz="quarter" idx="12"/>
+          </p:nvPr>
+        </p:nvSpPr>
+        <p:spPr/>
+        <p:txBody>
+          <a:bodyPr/>
+          <a:lstStyle/>
+          <a:p>
+            <a:fld id="{44B534F3-EDBB-4952-9E24-9629D31653E6}" type="slidenum">
+              <a:rPr lang="en-US" smtClean="0"/>
+              <a:t>9</a:t>
+            </a:fld>
+            <a:endParaRPr lang="en-US"/>
           </a:p>
         </p:txBody>
       </p:sp>
@@ -7131,4 +8652,265 @@
     </a:ext>
   </a:extLst>
 </a:theme>
+</file>
+
+<file path=ppt/theme/theme2.xml><?xml version="1.0" encoding="utf-8"?>
+<a:theme xmlns:a="http://schemas.openxmlformats.org/drawingml/2006/main" name="Office Theme">
+  <a:themeElements>
+    <a:clrScheme name="Office">
+      <a:dk1>
+        <a:sysClr val="windowText" lastClr="000000"/>
+      </a:dk1>
+      <a:lt1>
+        <a:sysClr val="window" lastClr="FFFFFF"/>
+      </a:lt1>
+      <a:dk2>
+        <a:srgbClr val="44546A"/>
+      </a:dk2>
+      <a:lt2>
+        <a:srgbClr val="E7E6E6"/>
+      </a:lt2>
+      <a:accent1>
+        <a:srgbClr val="5B9BD5"/>
+      </a:accent1>
+      <a:accent2>
+        <a:srgbClr val="ED7D31"/>
+      </a:accent2>
+      <a:accent3>
+        <a:srgbClr val="A5A5A5"/>
+      </a:accent3>
+      <a:accent4>
+        <a:srgbClr val="FFC000"/>
+      </a:accent4>
+      <a:accent5>
+        <a:srgbClr val="4472C4"/>
+      </a:accent5>
+      <a:accent6>
+        <a:srgbClr val="70AD47"/>
+      </a:accent6>
+      <a:hlink>
+        <a:srgbClr val="0563C1"/>
+      </a:hlink>
+      <a:folHlink>
+        <a:srgbClr val="954F72"/>
+      </a:folHlink>
+    </a:clrScheme>
+    <a:fontScheme name="Office">
+      <a:majorFont>
+        <a:latin typeface="Calibri Light" panose="020F0302020204030204"/>
+        <a:ea typeface=""/>
+        <a:cs typeface=""/>
+        <a:font script="Jpan" typeface="ＭＳ Ｐゴシック"/>
+        <a:font script="Hang" typeface="맑은 고딕"/>
+        <a:font script="Hans" typeface="宋体"/>
+        <a:font script="Hant" typeface="新細明體"/>
+        <a:font script="Arab" typeface="Times New Roman"/>
+        <a:font script="Hebr" typeface="Times New Roman"/>
+        <a:font script="Thai" typeface="Angsana New"/>
+        <a:font script="Ethi" typeface="Nyala"/>
+        <a:font script="Beng" typeface="Vrinda"/>
+        <a:font script="Gujr" typeface="Shruti"/>
+        <a:font script="Khmr" typeface="MoolBoran"/>
+        <a:font script="Knda" typeface="Tunga"/>
+        <a:font script="Guru" typeface="Raavi"/>
+        <a:font script="Cans" typeface="Euphemia"/>
+        <a:font script="Cher" typeface="Plantagenet Cherokee"/>
+        <a:font script="Yiii" typeface="Microsoft Yi Baiti"/>
+        <a:font script="Tibt" typeface="Microsoft Himalaya"/>
+        <a:font script="Thaa" typeface="MV Boli"/>
+        <a:font script="Deva" typeface="Mangal"/>
+        <a:font script="Telu" typeface="Gautami"/>
+        <a:font script="Taml" typeface="Latha"/>
+        <a:font script="Syrc" typeface="Estrangelo Edessa"/>
+        <a:font script="Orya" typeface="Kalinga"/>
+        <a:font script="Mlym" typeface="Kartika"/>
+        <a:font script="Laoo" typeface="DokChampa"/>
+        <a:font script="Sinh" typeface="Iskoola Pota"/>
+        <a:font script="Mong" typeface="Mongolian Baiti"/>
+        <a:font script="Viet" typeface="Times New Roman"/>
+        <a:font script="Uigh" typeface="Microsoft Uighur"/>
+        <a:font script="Geor" typeface="Sylfaen"/>
+      </a:majorFont>
+      <a:minorFont>
+        <a:latin typeface="Calibri" panose="020F0502020204030204"/>
+        <a:ea typeface=""/>
+        <a:cs typeface=""/>
+        <a:font script="Jpan" typeface="ＭＳ Ｐゴシック"/>
+        <a:font script="Hang" typeface="맑은 고딕"/>
+        <a:font script="Hans" typeface="宋体"/>
+        <a:font script="Hant" typeface="新細明體"/>
+        <a:font script="Arab" typeface="Arial"/>
+        <a:font script="Hebr" typeface="Arial"/>
+        <a:font script="Thai" typeface="Cordia New"/>
+        <a:font script="Ethi" typeface="Nyala"/>
+        <a:font script="Beng" typeface="Vrinda"/>
+        <a:font script="Gujr" typeface="Shruti"/>
+        <a:font script="Khmr" typeface="DaunPenh"/>
+        <a:font script="Knda" typeface="Tunga"/>
+        <a:font script="Guru" typeface="Raavi"/>
+        <a:font script="Cans" typeface="Euphemia"/>
+        <a:font script="Cher" typeface="Plantagenet Cherokee"/>
+        <a:font script="Yiii" typeface="Microsoft Yi Baiti"/>
+        <a:font script="Tibt" typeface="Microsoft Himalaya"/>
+        <a:font script="Thaa" typeface="MV Boli"/>
+        <a:font script="Deva" typeface="Mangal"/>
+        <a:font script="Telu" typeface="Gautami"/>
+        <a:font script="Taml" typeface="Latha"/>
+        <a:font script="Syrc" typeface="Estrangelo Edessa"/>
+        <a:font script="Orya" typeface="Kalinga"/>
+        <a:font script="Mlym" typeface="Kartika"/>
+        <a:font script="Laoo" typeface="DokChampa"/>
+        <a:font script="Sinh" typeface="Iskoola Pota"/>
+        <a:font script="Mong" typeface="Mongolian Baiti"/>
+        <a:font script="Viet" typeface="Arial"/>
+        <a:font script="Uigh" typeface="Microsoft Uighur"/>
+        <a:font script="Geor" typeface="Sylfaen"/>
+      </a:minorFont>
+    </a:fontScheme>
+    <a:fmtScheme name="Office">
+      <a:fillStyleLst>
+        <a:solidFill>
+          <a:schemeClr val="phClr"/>
+        </a:solidFill>
+        <a:gradFill rotWithShape="1">
+          <a:gsLst>
+            <a:gs pos="0">
+              <a:schemeClr val="phClr">
+                <a:lumMod val="110000"/>
+                <a:satMod val="105000"/>
+                <a:tint val="67000"/>
+              </a:schemeClr>
+            </a:gs>
+            <a:gs pos="50000">
+              <a:schemeClr val="phClr">
+                <a:lumMod val="105000"/>
+                <a:satMod val="103000"/>
+                <a:tint val="73000"/>
+              </a:schemeClr>
+            </a:gs>
+            <a:gs pos="100000">
+              <a:schemeClr val="phClr">
+                <a:lumMod val="105000"/>
+                <a:satMod val="109000"/>
+                <a:tint val="81000"/>
+              </a:schemeClr>
+            </a:gs>
+          </a:gsLst>
+          <a:lin ang="5400000" scaled="0"/>
+        </a:gradFill>
+        <a:gradFill rotWithShape="1">
+          <a:gsLst>
+            <a:gs pos="0">
+              <a:schemeClr val="phClr">
+                <a:satMod val="103000"/>
+                <a:lumMod val="102000"/>
+                <a:tint val="94000"/>
+              </a:schemeClr>
+            </a:gs>
+            <a:gs pos="50000">
+              <a:schemeClr val="phClr">
+                <a:satMod val="110000"/>
+                <a:lumMod val="100000"/>
+                <a:shade val="100000"/>
+              </a:schemeClr>
+            </a:gs>
+            <a:gs pos="100000">
+              <a:schemeClr val="phClr">
+                <a:lumMod val="99000"/>
+                <a:satMod val="120000"/>
+                <a:shade val="78000"/>
+              </a:schemeClr>
+            </a:gs>
+          </a:gsLst>
+          <a:lin ang="5400000" scaled="0"/>
+        </a:gradFill>
+      </a:fillStyleLst>
+      <a:lnStyleLst>
+        <a:ln w="6350" cap="flat" cmpd="sng" algn="ctr">
+          <a:solidFill>
+            <a:schemeClr val="phClr"/>
+          </a:solidFill>
+          <a:prstDash val="solid"/>
+          <a:miter lim="800000"/>
+        </a:ln>
+        <a:ln w="12700" cap="flat" cmpd="sng" algn="ctr">
+          <a:solidFill>
+            <a:schemeClr val="phClr"/>
+          </a:solidFill>
+          <a:prstDash val="solid"/>
+          <a:miter lim="800000"/>
+        </a:ln>
+        <a:ln w="19050" cap="flat" cmpd="sng" algn="ctr">
+          <a:solidFill>
+            <a:schemeClr val="phClr"/>
+          </a:solidFill>
+          <a:prstDash val="solid"/>
+          <a:miter lim="800000"/>
+        </a:ln>
+      </a:lnStyleLst>
+      <a:effectStyleLst>
+        <a:effectStyle>
+          <a:effectLst/>
+        </a:effectStyle>
+        <a:effectStyle>
+          <a:effectLst/>
+        </a:effectStyle>
+        <a:effectStyle>
+          <a:effectLst>
+            <a:outerShdw blurRad="57150" dist="19050" dir="5400000" algn="ctr" rotWithShape="0">
+              <a:srgbClr val="000000">
+                <a:alpha val="63000"/>
+              </a:srgbClr>
+            </a:outerShdw>
+          </a:effectLst>
+        </a:effectStyle>
+      </a:effectStyleLst>
+      <a:bgFillStyleLst>
+        <a:solidFill>
+          <a:schemeClr val="phClr"/>
+        </a:solidFill>
+        <a:solidFill>
+          <a:schemeClr val="phClr">
+            <a:tint val="95000"/>
+            <a:satMod val="170000"/>
+          </a:schemeClr>
+        </a:solidFill>
+        <a:gradFill rotWithShape="1">
+          <a:gsLst>
+            <a:gs pos="0">
+              <a:schemeClr val="phClr">
+                <a:tint val="93000"/>
+                <a:satMod val="150000"/>
+                <a:shade val="98000"/>
+                <a:lumMod val="102000"/>
+              </a:schemeClr>
+            </a:gs>
+            <a:gs pos="50000">
+              <a:schemeClr val="phClr">
+                <a:tint val="98000"/>
+                <a:satMod val="130000"/>
+                <a:shade val="90000"/>
+                <a:lumMod val="103000"/>
+              </a:schemeClr>
+            </a:gs>
+            <a:gs pos="100000">
+              <a:schemeClr val="phClr">
+                <a:shade val="63000"/>
+                <a:satMod val="120000"/>
+              </a:schemeClr>
+            </a:gs>
+          </a:gsLst>
+          <a:lin ang="5400000" scaled="0"/>
+        </a:gradFill>
+      </a:bgFillStyleLst>
+    </a:fmtScheme>
+  </a:themeElements>
+  <a:objectDefaults/>
+  <a:extraClrSchemeLst/>
+  <a:extLst>
+    <a:ext uri="{05A4C25C-085E-4340-85A3-A5531E510DB2}">
+      <thm15:themeFamily xmlns:thm15="http://schemas.microsoft.com/office/thememl/2012/main" name="Office Theme" id="{62F939B6-93AF-4DB8-9C6B-D6C7DFDC589F}" vid="{4A3C46E8-61CC-4603-A589-7422A47A8E4A}"/>
+    </a:ext>
+  </a:extLst>
+</a:theme>
 </file>
</xml_diff>